<commit_message>
modify architecture and framework-structure diagram
</commit_message>
<xml_diff>
--- a/docs/architecture/architecture-general.pptx
+++ b/docs/architecture/architecture-general.pptx
@@ -289,7 +289,7 @@
             <a:fld id="{3824DFC9-1527-4809-BF89-09BFD7F7436B}" type="datetimeFigureOut">
               <a:rPr lang="zh-CN" altLang="en-US" smtClean="0"/>
               <a:pPr/>
-              <a:t>2011-12-04</a:t>
+              <a:t>2011/12/27</a:t>
             </a:fld>
             <a:endParaRPr lang="zh-CN" altLang="en-US"/>
           </a:p>
@@ -456,7 +456,7 @@
             <a:fld id="{3824DFC9-1527-4809-BF89-09BFD7F7436B}" type="datetimeFigureOut">
               <a:rPr lang="zh-CN" altLang="en-US" smtClean="0"/>
               <a:pPr/>
-              <a:t>2011-12-04</a:t>
+              <a:t>2011/12/27</a:t>
             </a:fld>
             <a:endParaRPr lang="zh-CN" altLang="en-US"/>
           </a:p>
@@ -633,7 +633,7 @@
             <a:fld id="{3824DFC9-1527-4809-BF89-09BFD7F7436B}" type="datetimeFigureOut">
               <a:rPr lang="zh-CN" altLang="en-US" smtClean="0"/>
               <a:pPr/>
-              <a:t>2011-12-04</a:t>
+              <a:t>2011/12/27</a:t>
             </a:fld>
             <a:endParaRPr lang="zh-CN" altLang="en-US"/>
           </a:p>
@@ -800,7 +800,7 @@
             <a:fld id="{3824DFC9-1527-4809-BF89-09BFD7F7436B}" type="datetimeFigureOut">
               <a:rPr lang="zh-CN" altLang="en-US" smtClean="0"/>
               <a:pPr/>
-              <a:t>2011-12-04</a:t>
+              <a:t>2011/12/27</a:t>
             </a:fld>
             <a:endParaRPr lang="zh-CN" altLang="en-US"/>
           </a:p>
@@ -1043,7 +1043,7 @@
             <a:fld id="{3824DFC9-1527-4809-BF89-09BFD7F7436B}" type="datetimeFigureOut">
               <a:rPr lang="zh-CN" altLang="en-US" smtClean="0"/>
               <a:pPr/>
-              <a:t>2011-12-04</a:t>
+              <a:t>2011/12/27</a:t>
             </a:fld>
             <a:endParaRPr lang="zh-CN" altLang="en-US"/>
           </a:p>
@@ -1328,7 +1328,7 @@
             <a:fld id="{3824DFC9-1527-4809-BF89-09BFD7F7436B}" type="datetimeFigureOut">
               <a:rPr lang="zh-CN" altLang="en-US" smtClean="0"/>
               <a:pPr/>
-              <a:t>2011-12-04</a:t>
+              <a:t>2011/12/27</a:t>
             </a:fld>
             <a:endParaRPr lang="zh-CN" altLang="en-US"/>
           </a:p>
@@ -1747,7 +1747,7 @@
             <a:fld id="{3824DFC9-1527-4809-BF89-09BFD7F7436B}" type="datetimeFigureOut">
               <a:rPr lang="zh-CN" altLang="en-US" smtClean="0"/>
               <a:pPr/>
-              <a:t>2011-12-04</a:t>
+              <a:t>2011/12/27</a:t>
             </a:fld>
             <a:endParaRPr lang="zh-CN" altLang="en-US"/>
           </a:p>
@@ -1862,7 +1862,7 @@
             <a:fld id="{3824DFC9-1527-4809-BF89-09BFD7F7436B}" type="datetimeFigureOut">
               <a:rPr lang="zh-CN" altLang="en-US" smtClean="0"/>
               <a:pPr/>
-              <a:t>2011-12-04</a:t>
+              <a:t>2011/12/27</a:t>
             </a:fld>
             <a:endParaRPr lang="zh-CN" altLang="en-US"/>
           </a:p>
@@ -1954,7 +1954,7 @@
             <a:fld id="{3824DFC9-1527-4809-BF89-09BFD7F7436B}" type="datetimeFigureOut">
               <a:rPr lang="zh-CN" altLang="en-US" smtClean="0"/>
               <a:pPr/>
-              <a:t>2011-12-04</a:t>
+              <a:t>2011/12/27</a:t>
             </a:fld>
             <a:endParaRPr lang="zh-CN" altLang="en-US"/>
           </a:p>
@@ -2228,7 +2228,7 @@
             <a:fld id="{3824DFC9-1527-4809-BF89-09BFD7F7436B}" type="datetimeFigureOut">
               <a:rPr lang="zh-CN" altLang="en-US" smtClean="0"/>
               <a:pPr/>
-              <a:t>2011-12-04</a:t>
+              <a:t>2011/12/27</a:t>
             </a:fld>
             <a:endParaRPr lang="zh-CN" altLang="en-US"/>
           </a:p>
@@ -2478,7 +2478,7 @@
             <a:fld id="{3824DFC9-1527-4809-BF89-09BFD7F7436B}" type="datetimeFigureOut">
               <a:rPr lang="zh-CN" altLang="en-US" smtClean="0"/>
               <a:pPr/>
-              <a:t>2011-12-04</a:t>
+              <a:t>2011/12/27</a:t>
             </a:fld>
             <a:endParaRPr lang="zh-CN" altLang="en-US"/>
           </a:p>
@@ -2688,7 +2688,7 @@
             <a:fld id="{3824DFC9-1527-4809-BF89-09BFD7F7436B}" type="datetimeFigureOut">
               <a:rPr lang="zh-CN" altLang="en-US" smtClean="0"/>
               <a:pPr/>
-              <a:t>2011-12-04</a:t>
+              <a:t>2011/12/27</a:t>
             </a:fld>
             <a:endParaRPr lang="zh-CN" altLang="en-US"/>
           </a:p>
@@ -3446,7 +3446,7 @@
               <a:pPr algn="ctr"/>
               <a:r>
                 <a:rPr lang="en-US" altLang="zh-CN" sz="4000" dirty="0" smtClean="0"/>
-                <a:t>Physical Data Model</a:t>
+                <a:t>Template Data Object</a:t>
               </a:r>
               <a:endParaRPr lang="zh-CN" altLang="en-US" sz="4000" dirty="0"/>
             </a:p>

</xml_diff>